<commit_message>
create script for analysis, add missing 1991 event in present block
</commit_message>
<xml_diff>
--- a/documents/participant_event_list13.pptx
+++ b/documents/participant_event_list13.pptx
@@ -105,6 +105,11 @@
       </a:defRPr>
     </a:lvl9pPr>
   </p:defaultTextStyle>
+  <p:extLst>
+    <p:ext uri="{EFAFB233-063F-42B5-8137-9DF3F51BA10A}">
+      <p15:sldGuideLst xmlns:p15="http://schemas.microsoft.com/office/powerpoint/2012/main"/>
+    </p:ext>
+  </p:extLst>
 </p:presentation>
 </file>
 
@@ -239,7 +244,7 @@
           <a:p>
             <a:fld id="{EFB00B83-6AD3-436A-8B40-4D2FC8877E50}" type="datetimeFigureOut">
               <a:rPr lang="fr-FR" smtClean="0"/>
-              <a:t>27/04/2019</a:t>
+              <a:t>30/04/2019</a:t>
             </a:fld>
             <a:endParaRPr lang="fr-FR"/>
           </a:p>
@@ -409,7 +414,7 @@
           <a:p>
             <a:fld id="{EFB00B83-6AD3-436A-8B40-4D2FC8877E50}" type="datetimeFigureOut">
               <a:rPr lang="fr-FR" smtClean="0"/>
-              <a:t>27/04/2019</a:t>
+              <a:t>30/04/2019</a:t>
             </a:fld>
             <a:endParaRPr lang="fr-FR"/>
           </a:p>
@@ -589,7 +594,7 @@
           <a:p>
             <a:fld id="{EFB00B83-6AD3-436A-8B40-4D2FC8877E50}" type="datetimeFigureOut">
               <a:rPr lang="fr-FR" smtClean="0"/>
-              <a:t>27/04/2019</a:t>
+              <a:t>30/04/2019</a:t>
             </a:fld>
             <a:endParaRPr lang="fr-FR"/>
           </a:p>
@@ -759,7 +764,7 @@
           <a:p>
             <a:fld id="{EFB00B83-6AD3-436A-8B40-4D2FC8877E50}" type="datetimeFigureOut">
               <a:rPr lang="fr-FR" smtClean="0"/>
-              <a:t>27/04/2019</a:t>
+              <a:t>30/04/2019</a:t>
             </a:fld>
             <a:endParaRPr lang="fr-FR"/>
           </a:p>
@@ -1005,7 +1010,7 @@
           <a:p>
             <a:fld id="{EFB00B83-6AD3-436A-8B40-4D2FC8877E50}" type="datetimeFigureOut">
               <a:rPr lang="fr-FR" smtClean="0"/>
-              <a:t>27/04/2019</a:t>
+              <a:t>30/04/2019</a:t>
             </a:fld>
             <a:endParaRPr lang="fr-FR"/>
           </a:p>
@@ -1237,7 +1242,7 @@
           <a:p>
             <a:fld id="{EFB00B83-6AD3-436A-8B40-4D2FC8877E50}" type="datetimeFigureOut">
               <a:rPr lang="fr-FR" smtClean="0"/>
-              <a:t>27/04/2019</a:t>
+              <a:t>30/04/2019</a:t>
             </a:fld>
             <a:endParaRPr lang="fr-FR"/>
           </a:p>
@@ -1604,7 +1609,7 @@
           <a:p>
             <a:fld id="{EFB00B83-6AD3-436A-8B40-4D2FC8877E50}" type="datetimeFigureOut">
               <a:rPr lang="fr-FR" smtClean="0"/>
-              <a:t>27/04/2019</a:t>
+              <a:t>30/04/2019</a:t>
             </a:fld>
             <a:endParaRPr lang="fr-FR"/>
           </a:p>
@@ -1722,7 +1727,7 @@
           <a:p>
             <a:fld id="{EFB00B83-6AD3-436A-8B40-4D2FC8877E50}" type="datetimeFigureOut">
               <a:rPr lang="fr-FR" smtClean="0"/>
-              <a:t>27/04/2019</a:t>
+              <a:t>30/04/2019</a:t>
             </a:fld>
             <a:endParaRPr lang="fr-FR"/>
           </a:p>
@@ -1817,7 +1822,7 @@
           <a:p>
             <a:fld id="{EFB00B83-6AD3-436A-8B40-4D2FC8877E50}" type="datetimeFigureOut">
               <a:rPr lang="fr-FR" smtClean="0"/>
-              <a:t>27/04/2019</a:t>
+              <a:t>30/04/2019</a:t>
             </a:fld>
             <a:endParaRPr lang="fr-FR"/>
           </a:p>
@@ -2094,7 +2099,7 @@
           <a:p>
             <a:fld id="{EFB00B83-6AD3-436A-8B40-4D2FC8877E50}" type="datetimeFigureOut">
               <a:rPr lang="fr-FR" smtClean="0"/>
-              <a:t>27/04/2019</a:t>
+              <a:t>30/04/2019</a:t>
             </a:fld>
             <a:endParaRPr lang="fr-FR"/>
           </a:p>
@@ -2347,7 +2352,7 @@
           <a:p>
             <a:fld id="{EFB00B83-6AD3-436A-8B40-4D2FC8877E50}" type="datetimeFigureOut">
               <a:rPr lang="fr-FR" smtClean="0"/>
-              <a:t>27/04/2019</a:t>
+              <a:t>30/04/2019</a:t>
             </a:fld>
             <a:endParaRPr lang="fr-FR"/>
           </a:p>
@@ -2560,7 +2565,7 @@
           <a:p>
             <a:fld id="{EFB00B83-6AD3-436A-8B40-4D2FC8877E50}" type="datetimeFigureOut">
               <a:rPr lang="fr-FR" smtClean="0"/>
-              <a:t>27/04/2019</a:t>
+              <a:t>30/04/2019</a:t>
             </a:fld>
             <a:endParaRPr lang="fr-FR"/>
           </a:p>
@@ -3002,29 +3007,33 @@
           <a:p>
             <a:pPr algn="ctr"/>
             <a:r>
-              <a:rPr lang="fr-FR" sz="1400" dirty="0" smtClean="0"/>
-              <a:t>2047</a:t>
-            </a:r>
-          </a:p>
-          <a:p>
-            <a:pPr algn="ctr"/>
-            <a:r>
-              <a:rPr lang="fr-FR" sz="1400" dirty="0" smtClean="0"/>
-              <a:t>« 9.5 milliards »</a:t>
-            </a:r>
-          </a:p>
-          <a:p>
-            <a:pPr algn="ctr"/>
-            <a:r>
-              <a:rPr lang="fr-FR" sz="1400" dirty="0" smtClean="0"/>
-              <a:t>Réel</a:t>
-            </a:r>
-          </a:p>
-          <a:p>
-            <a:pPr algn="ctr"/>
+              <a:rPr lang="fr-FR" sz="1400" dirty="0"/>
+              <a:t>2015</a:t>
+            </a:r>
+          </a:p>
+          <a:p>
+            <a:pPr algn="ctr"/>
+            <a:r>
+              <a:rPr lang="fr-FR" sz="1400" dirty="0"/>
+              <a:t>« musée Metallica »</a:t>
+            </a:r>
+          </a:p>
+          <a:p>
+            <a:pPr algn="ctr"/>
+            <a:r>
+              <a:rPr lang="fr-FR" sz="1400" dirty="0"/>
+              <a:t>Fictif</a:t>
+            </a:r>
+          </a:p>
+          <a:p>
+            <a:pPr algn="ctr"/>
+            <a:r>
+              <a:rPr lang="fr-FR" sz="1200" dirty="0"/>
+              <a:t>Inauguration du musée Metallica à Los </a:t>
+            </a:r>
             <a:r>
               <a:rPr lang="fr-FR" sz="1200" dirty="0" smtClean="0"/>
-              <a:t>La population mondiale atteint 9.5 milliards</a:t>
+              <a:t>Angeles</a:t>
             </a:r>
             <a:endParaRPr lang="fr-FR" sz="1200" dirty="0"/>
           </a:p>
@@ -3067,29 +3076,33 @@
           <a:p>
             <a:pPr algn="ctr"/>
             <a:r>
-              <a:rPr lang="fr-FR" sz="1400" dirty="0" smtClean="0"/>
-              <a:t>2041</a:t>
-            </a:r>
-          </a:p>
-          <a:p>
-            <a:pPr algn="ctr"/>
-            <a:r>
-              <a:rPr lang="fr-FR" sz="1400" dirty="0" smtClean="0"/>
-              <a:t>« tunnel Béring »</a:t>
-            </a:r>
-          </a:p>
-          <a:p>
-            <a:pPr algn="ctr"/>
-            <a:r>
-              <a:rPr lang="fr-FR" sz="1400" dirty="0" smtClean="0"/>
+              <a:rPr lang="fr-FR" sz="1400" dirty="0"/>
+              <a:t>1985</a:t>
+            </a:r>
+          </a:p>
+          <a:p>
+            <a:pPr algn="ctr"/>
+            <a:r>
+              <a:rPr lang="fr-FR" sz="1400" dirty="0"/>
+              <a:t>« trou ozone »</a:t>
+            </a:r>
+          </a:p>
+          <a:p>
+            <a:pPr algn="ctr"/>
+            <a:r>
+              <a:rPr lang="fr-FR" sz="1400" dirty="0"/>
               <a:t>Réel</a:t>
             </a:r>
           </a:p>
           <a:p>
             <a:pPr algn="ctr"/>
             <a:r>
+              <a:rPr lang="fr-FR" sz="1200" dirty="0"/>
+              <a:t>Découverte du trou dans la couche </a:t>
+            </a:r>
+            <a:r>
               <a:rPr lang="fr-FR" sz="1200" dirty="0" smtClean="0"/>
-              <a:t>Ouverture du tunnel sous le détroit de Béring</a:t>
+              <a:t>d’ozone</a:t>
             </a:r>
             <a:endParaRPr lang="fr-FR" sz="1200" dirty="0"/>
           </a:p>
@@ -3132,29 +3145,33 @@
           <a:p>
             <a:pPr algn="ctr"/>
             <a:r>
-              <a:rPr lang="fr-FR" sz="1400" dirty="0" smtClean="0"/>
-              <a:t>2029</a:t>
-            </a:r>
-          </a:p>
-          <a:p>
-            <a:pPr algn="ctr"/>
-            <a:r>
-              <a:rPr lang="fr-FR" sz="1400" dirty="0" smtClean="0"/>
-              <a:t>« usine photosynthèse »</a:t>
-            </a:r>
-          </a:p>
-          <a:p>
-            <a:pPr algn="ctr"/>
-            <a:r>
-              <a:rPr lang="fr-FR" sz="1400" dirty="0" smtClean="0"/>
-              <a:t>Fictif</a:t>
-            </a:r>
-          </a:p>
-          <a:p>
-            <a:pPr algn="ctr"/>
+              <a:rPr lang="fr-FR" sz="1400" dirty="0"/>
+              <a:t>2003</a:t>
+            </a:r>
+          </a:p>
+          <a:p>
+            <a:pPr algn="ctr"/>
+            <a:r>
+              <a:rPr lang="fr-FR" sz="1400" dirty="0"/>
+              <a:t>« génome humain »</a:t>
+            </a:r>
+          </a:p>
+          <a:p>
+            <a:pPr algn="ctr"/>
+            <a:r>
+              <a:rPr lang="fr-FR" sz="1400" dirty="0"/>
+              <a:t>Réel</a:t>
+            </a:r>
+          </a:p>
+          <a:p>
+            <a:pPr algn="ctr"/>
+            <a:r>
+              <a:rPr lang="fr-FR" sz="1200" dirty="0"/>
+              <a:t>Séquençage complet du génome </a:t>
+            </a:r>
             <a:r>
               <a:rPr lang="fr-FR" sz="1200" dirty="0" smtClean="0"/>
-              <a:t>Première usine de photosynthèse artificielle</a:t>
+              <a:t>humain</a:t>
             </a:r>
             <a:endParaRPr lang="fr-FR" sz="1200" dirty="0"/>
           </a:p>
@@ -3197,29 +3214,57 @@
           <a:p>
             <a:pPr algn="ctr"/>
             <a:r>
-              <a:rPr lang="fr-FR" sz="1400" dirty="0" smtClean="0"/>
-              <a:t>2050</a:t>
-            </a:r>
-          </a:p>
-          <a:p>
-            <a:pPr algn="ctr"/>
-            <a:r>
-              <a:rPr lang="fr-FR" sz="1400" dirty="0" smtClean="0"/>
-              <a:t>« humain Mars »</a:t>
-            </a:r>
-          </a:p>
-          <a:p>
-            <a:pPr algn="ctr"/>
-            <a:r>
-              <a:rPr lang="fr-FR" sz="1400" dirty="0" smtClean="0"/>
-              <a:t>Fictif</a:t>
-            </a:r>
-          </a:p>
-          <a:p>
-            <a:pPr algn="ctr"/>
+              <a:rPr lang="fr-FR" sz="1400" dirty="0"/>
+              <a:t>2012</a:t>
+            </a:r>
+          </a:p>
+          <a:p>
+            <a:pPr algn="ctr"/>
+            <a:r>
+              <a:rPr lang="fr-FR" sz="1400" dirty="0"/>
+              <a:t>« </a:t>
+            </a:r>
+            <a:r>
+              <a:rPr lang="fr-FR" sz="1400" dirty="0" err="1"/>
+              <a:t>Curiosity</a:t>
+            </a:r>
+            <a:r>
+              <a:rPr lang="fr-FR" sz="1400" dirty="0"/>
+              <a:t> Mars »</a:t>
+            </a:r>
+          </a:p>
+          <a:p>
+            <a:pPr algn="ctr"/>
+            <a:r>
+              <a:rPr lang="fr-FR" sz="1400" dirty="0"/>
+              <a:t>Réel</a:t>
+            </a:r>
+          </a:p>
+          <a:p>
+            <a:pPr algn="ctr"/>
+            <a:r>
+              <a:rPr lang="fr-FR" sz="1200" dirty="0"/>
+              <a:t>Le robot </a:t>
+            </a:r>
+            <a:r>
+              <a:rPr lang="fr-FR" sz="1200" dirty="0" err="1"/>
+              <a:t>astromobile</a:t>
+            </a:r>
+            <a:r>
+              <a:rPr lang="fr-FR" sz="1200" dirty="0"/>
+              <a:t> </a:t>
+            </a:r>
+            <a:r>
+              <a:rPr lang="fr-FR" sz="1200" dirty="0" err="1"/>
+              <a:t>Curiosity</a:t>
+            </a:r>
+            <a:r>
+              <a:rPr lang="fr-FR" sz="1200" dirty="0"/>
+              <a:t> atterrit sur </a:t>
+            </a:r>
             <a:r>
               <a:rPr lang="fr-FR" sz="1200" dirty="0" smtClean="0"/>
-              <a:t>Premier être humain à marcher sur Mars</a:t>
+              <a:t>Mars</a:t>
             </a:r>
             <a:endParaRPr lang="fr-FR" sz="1200" dirty="0"/>
           </a:p>
@@ -3262,29 +3307,33 @@
           <a:p>
             <a:pPr algn="ctr"/>
             <a:r>
-              <a:rPr lang="fr-FR" sz="1400" dirty="0" smtClean="0"/>
-              <a:t>2009</a:t>
-            </a:r>
-          </a:p>
-          <a:p>
-            <a:pPr algn="ctr"/>
-            <a:r>
-              <a:rPr lang="fr-FR" sz="1400" dirty="0" smtClean="0"/>
-              <a:t>« création Bitcoin »</a:t>
-            </a:r>
-          </a:p>
-          <a:p>
-            <a:pPr algn="ctr"/>
-            <a:r>
-              <a:rPr lang="fr-FR" sz="1400" dirty="0" smtClean="0"/>
-              <a:t>Réel</a:t>
-            </a:r>
-          </a:p>
-          <a:p>
-            <a:pPr algn="ctr"/>
+              <a:rPr lang="fr-FR" sz="1400" dirty="0"/>
+              <a:t>2023</a:t>
+            </a:r>
+          </a:p>
+          <a:p>
+            <a:pPr algn="ctr"/>
+            <a:r>
+              <a:rPr lang="fr-FR" sz="1400" dirty="0"/>
+              <a:t>« loup Japon »</a:t>
+            </a:r>
+          </a:p>
+          <a:p>
+            <a:pPr algn="ctr"/>
+            <a:r>
+              <a:rPr lang="fr-FR" sz="1400" dirty="0"/>
+              <a:t>Fictif</a:t>
+            </a:r>
+          </a:p>
+          <a:p>
+            <a:pPr algn="ctr"/>
+            <a:r>
+              <a:rPr lang="fr-FR" sz="1200" dirty="0"/>
+              <a:t>Réintroduction du loup au </a:t>
+            </a:r>
             <a:r>
               <a:rPr lang="fr-FR" sz="1200" dirty="0" smtClean="0"/>
-              <a:t>Création de la monnaie virtuelle Bitcoin</a:t>
+              <a:t>Japon</a:t>
             </a:r>
             <a:endParaRPr lang="fr-FR" sz="1200" dirty="0"/>
           </a:p>
@@ -3327,29 +3376,33 @@
           <a:p>
             <a:pPr algn="ctr"/>
             <a:r>
-              <a:rPr lang="fr-FR" sz="1400" dirty="0" smtClean="0"/>
-              <a:t>2023</a:t>
-            </a:r>
-          </a:p>
-          <a:p>
-            <a:pPr algn="ctr"/>
-            <a:r>
-              <a:rPr lang="fr-FR" sz="1400" dirty="0" smtClean="0"/>
-              <a:t>« loup Japon »</a:t>
-            </a:r>
-          </a:p>
-          <a:p>
-            <a:pPr algn="ctr"/>
-            <a:r>
-              <a:rPr lang="fr-FR" sz="1400" dirty="0" smtClean="0"/>
-              <a:t>Fictif</a:t>
-            </a:r>
-          </a:p>
-          <a:p>
-            <a:pPr algn="ctr"/>
+              <a:rPr lang="fr-FR" sz="1400" dirty="0"/>
+              <a:t>2009</a:t>
+            </a:r>
+          </a:p>
+          <a:p>
+            <a:pPr algn="ctr"/>
+            <a:r>
+              <a:rPr lang="fr-FR" sz="1400" dirty="0"/>
+              <a:t>« création Bitcoin »</a:t>
+            </a:r>
+          </a:p>
+          <a:p>
+            <a:pPr algn="ctr"/>
+            <a:r>
+              <a:rPr lang="fr-FR" sz="1400" dirty="0"/>
+              <a:t>Réel</a:t>
+            </a:r>
+          </a:p>
+          <a:p>
+            <a:pPr algn="ctr"/>
+            <a:r>
+              <a:rPr lang="fr-FR" sz="1200" dirty="0"/>
+              <a:t>Création de la monnaie virtuelle </a:t>
+            </a:r>
             <a:r>
               <a:rPr lang="fr-FR" sz="1200" dirty="0" smtClean="0"/>
-              <a:t>Réintroduction du loup au Japon</a:t>
+              <a:t>Bitcoin</a:t>
             </a:r>
             <a:endParaRPr lang="fr-FR" sz="1200" dirty="0"/>
           </a:p>
@@ -3392,29 +3445,33 @@
           <a:p>
             <a:pPr algn="ctr"/>
             <a:r>
-              <a:rPr lang="fr-FR" sz="1400" dirty="0" smtClean="0"/>
-              <a:t>1988</a:t>
-            </a:r>
-          </a:p>
-          <a:p>
-            <a:pPr algn="ctr"/>
-            <a:r>
-              <a:rPr lang="fr-FR" sz="1400" dirty="0" smtClean="0"/>
-              <a:t>« JO Nagoya »</a:t>
-            </a:r>
-          </a:p>
-          <a:p>
-            <a:pPr algn="ctr"/>
-            <a:r>
-              <a:rPr lang="fr-FR" sz="1400" dirty="0" smtClean="0"/>
+              <a:rPr lang="fr-FR" sz="1400" dirty="0"/>
+              <a:t>2050</a:t>
+            </a:r>
+          </a:p>
+          <a:p>
+            <a:pPr algn="ctr"/>
+            <a:r>
+              <a:rPr lang="fr-FR" sz="1400" dirty="0"/>
+              <a:t>« humain Mars »</a:t>
+            </a:r>
+          </a:p>
+          <a:p>
+            <a:pPr algn="ctr"/>
+            <a:r>
+              <a:rPr lang="fr-FR" sz="1400" dirty="0"/>
               <a:t>Fictif</a:t>
             </a:r>
           </a:p>
           <a:p>
             <a:pPr algn="ctr"/>
             <a:r>
+              <a:rPr lang="fr-FR" sz="1200" dirty="0"/>
+              <a:t>Premier être humain à marcher sur </a:t>
+            </a:r>
+            <a:r>
               <a:rPr lang="fr-FR" sz="1200" dirty="0" smtClean="0"/>
-              <a:t>Jeux Olympiques à Nagoya</a:t>
+              <a:t>Mars</a:t>
             </a:r>
             <a:endParaRPr lang="fr-FR" sz="1200" dirty="0"/>
           </a:p>
@@ -3457,29 +3514,33 @@
           <a:p>
             <a:pPr algn="ctr"/>
             <a:r>
-              <a:rPr lang="fr-FR" sz="1400" dirty="0" smtClean="0"/>
-              <a:t>2026</a:t>
-            </a:r>
-          </a:p>
-          <a:p>
-            <a:pPr algn="ctr"/>
-            <a:r>
-              <a:rPr lang="fr-FR" sz="1400" dirty="0" smtClean="0"/>
-              <a:t>« inauguration Dubaïland »</a:t>
-            </a:r>
-          </a:p>
-          <a:p>
-            <a:pPr algn="ctr"/>
-            <a:r>
-              <a:rPr lang="fr-FR" sz="1400" dirty="0" smtClean="0"/>
-              <a:t>Réel</a:t>
-            </a:r>
-          </a:p>
-          <a:p>
-            <a:pPr algn="ctr"/>
+              <a:rPr lang="fr-FR" sz="1400" dirty="0"/>
+              <a:t>2038</a:t>
+            </a:r>
+          </a:p>
+          <a:p>
+            <a:pPr algn="ctr"/>
+            <a:r>
+              <a:rPr lang="fr-FR" sz="1400" dirty="0"/>
+              <a:t>« avions solaires »</a:t>
+            </a:r>
+          </a:p>
+          <a:p>
+            <a:pPr algn="ctr"/>
+            <a:r>
+              <a:rPr lang="fr-FR" sz="1400" dirty="0"/>
+              <a:t>Fictif</a:t>
+            </a:r>
+          </a:p>
+          <a:p>
+            <a:pPr algn="ctr"/>
+            <a:r>
+              <a:rPr lang="fr-FR" sz="1200" dirty="0"/>
+              <a:t>Ligne d’avions solaires Los Angeles -  Rio de </a:t>
+            </a:r>
             <a:r>
               <a:rPr lang="fr-FR" sz="1200" dirty="0" smtClean="0"/>
-              <a:t>Inauguration du complexe de loisirs Dubaïland</a:t>
+              <a:t>Janeiro</a:t>
             </a:r>
             <a:endParaRPr lang="fr-FR" sz="1200" dirty="0"/>
           </a:p>
@@ -3522,29 +3583,41 @@
           <a:p>
             <a:pPr algn="ctr"/>
             <a:r>
-              <a:rPr lang="fr-FR" sz="1400" dirty="0" smtClean="0"/>
-              <a:t>2038</a:t>
-            </a:r>
-          </a:p>
-          <a:p>
-            <a:pPr algn="ctr"/>
-            <a:r>
-              <a:rPr lang="fr-FR" sz="1400" dirty="0" smtClean="0"/>
-              <a:t>« avions solaires »</a:t>
-            </a:r>
-          </a:p>
-          <a:p>
-            <a:pPr algn="ctr"/>
-            <a:r>
-              <a:rPr lang="fr-FR" sz="1400" dirty="0" smtClean="0"/>
-              <a:t>Fictif</a:t>
-            </a:r>
-          </a:p>
-          <a:p>
-            <a:pPr algn="ctr"/>
-            <a:r>
-              <a:rPr lang="fr-FR" sz="1200" dirty="0" smtClean="0"/>
-              <a:t>Ligne d’avions solaires Los Angeles -  Rio de Janeiro</a:t>
+              <a:rPr lang="fr-FR" sz="1400" dirty="0"/>
+              <a:t>2026</a:t>
+            </a:r>
+          </a:p>
+          <a:p>
+            <a:pPr algn="ctr"/>
+            <a:r>
+              <a:rPr lang="fr-FR" sz="1400" dirty="0"/>
+              <a:t>« inauguration </a:t>
+            </a:r>
+            <a:r>
+              <a:rPr lang="fr-FR" sz="1400" dirty="0" err="1"/>
+              <a:t>Dubaïland</a:t>
+            </a:r>
+            <a:r>
+              <a:rPr lang="fr-FR" sz="1400" dirty="0"/>
+              <a:t> »</a:t>
+            </a:r>
+          </a:p>
+          <a:p>
+            <a:pPr algn="ctr"/>
+            <a:r>
+              <a:rPr lang="fr-FR" sz="1400" dirty="0"/>
+              <a:t>Réel</a:t>
+            </a:r>
+          </a:p>
+          <a:p>
+            <a:pPr algn="ctr"/>
+            <a:r>
+              <a:rPr lang="fr-FR" sz="1200" dirty="0"/>
+              <a:t>Inauguration du complexe de loisirs </a:t>
+            </a:r>
+            <a:r>
+              <a:rPr lang="fr-FR" sz="1200" dirty="0" err="1" smtClean="0"/>
+              <a:t>Dubaïland</a:t>
             </a:r>
             <a:endParaRPr lang="fr-FR" sz="1200" dirty="0"/>
           </a:p>
@@ -3587,29 +3660,33 @@
           <a:p>
             <a:pPr algn="ctr"/>
             <a:r>
-              <a:rPr lang="fr-FR" sz="1400" dirty="0" smtClean="0"/>
-              <a:t>Fin 2019</a:t>
-            </a:r>
-          </a:p>
-          <a:p>
-            <a:pPr algn="ctr"/>
-            <a:r>
-              <a:rPr lang="fr-FR" sz="1400" dirty="0" smtClean="0"/>
-              <a:t>« coupe football »</a:t>
-            </a:r>
-          </a:p>
-          <a:p>
-            <a:pPr algn="ctr"/>
-            <a:r>
-              <a:rPr lang="fr-FR" sz="1400" dirty="0" smtClean="0"/>
-              <a:t>Réel</a:t>
-            </a:r>
-          </a:p>
-          <a:p>
-            <a:pPr algn="ctr"/>
+              <a:rPr lang="fr-FR" sz="1400" dirty="0"/>
+              <a:t>2029</a:t>
+            </a:r>
+          </a:p>
+          <a:p>
+            <a:pPr algn="ctr"/>
+            <a:r>
+              <a:rPr lang="fr-FR" sz="1400" dirty="0"/>
+              <a:t>« usine photosynthèse »</a:t>
+            </a:r>
+          </a:p>
+          <a:p>
+            <a:pPr algn="ctr"/>
+            <a:r>
+              <a:rPr lang="fr-FR" sz="1400" dirty="0"/>
+              <a:t>Fictif</a:t>
+            </a:r>
+          </a:p>
+          <a:p>
+            <a:pPr algn="ctr"/>
+            <a:r>
+              <a:rPr lang="fr-FR" sz="1200" dirty="0"/>
+              <a:t>Première usine de photosynthèse </a:t>
+            </a:r>
             <a:r>
               <a:rPr lang="fr-FR" sz="1200" dirty="0" smtClean="0"/>
-              <a:t>Coupe du monde de football féminin</a:t>
+              <a:t>artificielle</a:t>
             </a:r>
             <a:endParaRPr lang="fr-FR" sz="1200" dirty="0"/>
           </a:p>
@@ -3766,29 +3843,45 @@
           <a:p>
             <a:pPr algn="ctr"/>
             <a:r>
-              <a:rPr lang="fr-FR" sz="1400" dirty="0" smtClean="0"/>
-              <a:t>2053</a:t>
-            </a:r>
-          </a:p>
-          <a:p>
-            <a:pPr algn="ctr"/>
-            <a:r>
-              <a:rPr lang="fr-FR" sz="1400" dirty="0" smtClean="0"/>
-              <a:t>« gaz renouvelable »</a:t>
-            </a:r>
-          </a:p>
-          <a:p>
-            <a:pPr algn="ctr"/>
-            <a:r>
-              <a:rPr lang="fr-FR" sz="1400" dirty="0" smtClean="0"/>
-              <a:t>Réel</a:t>
-            </a:r>
-          </a:p>
-          <a:p>
-            <a:pPr algn="ctr"/>
+              <a:rPr lang="fr-FR" sz="1400" dirty="0"/>
+              <a:t>Début 2019</a:t>
+            </a:r>
+          </a:p>
+          <a:p>
+            <a:pPr algn="ctr"/>
+            <a:r>
+              <a:rPr lang="fr-FR" sz="1400" dirty="0"/>
+              <a:t>« </a:t>
+            </a:r>
+            <a:r>
+              <a:rPr lang="fr-FR" sz="1400" dirty="0" err="1"/>
+              <a:t>Netflix</a:t>
+            </a:r>
+            <a:r>
+              <a:rPr lang="fr-FR" sz="1400" dirty="0"/>
+              <a:t> Friends »</a:t>
+            </a:r>
+          </a:p>
+          <a:p>
+            <a:pPr algn="ctr"/>
+            <a:r>
+              <a:rPr lang="fr-FR" sz="1400" dirty="0"/>
+              <a:t>Fictif</a:t>
+            </a:r>
+          </a:p>
+          <a:p>
+            <a:pPr algn="ctr"/>
+            <a:r>
+              <a:rPr lang="fr-FR" sz="1200" dirty="0" err="1"/>
+              <a:t>Netflix</a:t>
+            </a:r>
+            <a:r>
+              <a:rPr lang="fr-FR" sz="1200" dirty="0"/>
+              <a:t> annonce une nouvelle saison de la série </a:t>
+            </a:r>
             <a:r>
               <a:rPr lang="fr-FR" sz="1200" dirty="0" smtClean="0"/>
-              <a:t>Le réseau de gaz français devient 100% renouvelable</a:t>
+              <a:t>Friends</a:t>
             </a:r>
             <a:endParaRPr lang="fr-FR" sz="1200" dirty="0"/>
           </a:p>
@@ -3831,29 +3924,33 @@
           <a:p>
             <a:pPr algn="ctr"/>
             <a:r>
-              <a:rPr lang="fr-FR" sz="1400" dirty="0" smtClean="0"/>
-              <a:t>2018</a:t>
-            </a:r>
-          </a:p>
-          <a:p>
-            <a:pPr algn="ctr"/>
-            <a:r>
-              <a:rPr lang="fr-FR" sz="1400" dirty="0" smtClean="0"/>
-              <a:t>« Simone Veil »</a:t>
-            </a:r>
-          </a:p>
-          <a:p>
-            <a:pPr algn="ctr"/>
-            <a:r>
-              <a:rPr lang="fr-FR" sz="1400" dirty="0" smtClean="0"/>
+              <a:rPr lang="fr-FR" sz="1400" dirty="0"/>
+              <a:t>1991</a:t>
+            </a:r>
+          </a:p>
+          <a:p>
+            <a:pPr algn="ctr"/>
+            <a:r>
+              <a:rPr lang="fr-FR" sz="1400" dirty="0"/>
+              <a:t>« dislocation URSS »</a:t>
+            </a:r>
+          </a:p>
+          <a:p>
+            <a:pPr algn="ctr"/>
+            <a:r>
+              <a:rPr lang="fr-FR" sz="1400" dirty="0"/>
               <a:t>Réel</a:t>
             </a:r>
           </a:p>
           <a:p>
             <a:pPr algn="ctr"/>
             <a:r>
+              <a:rPr lang="fr-FR" sz="1200" dirty="0"/>
+              <a:t>Dislocation de </a:t>
+            </a:r>
+            <a:r>
               <a:rPr lang="fr-FR" sz="1200" dirty="0" smtClean="0"/>
-              <a:t>Panthéonisation de Simone Veil</a:t>
+              <a:t>l’URSS</a:t>
             </a:r>
             <a:endParaRPr lang="fr-FR" sz="1200" dirty="0"/>
           </a:p>
@@ -3896,37 +3993,33 @@
           <a:p>
             <a:pPr algn="ctr"/>
             <a:r>
-              <a:rPr lang="fr-FR" sz="1400" dirty="0" smtClean="0"/>
-              <a:t>2006</a:t>
-            </a:r>
-          </a:p>
-          <a:p>
-            <a:pPr algn="ctr"/>
-            <a:r>
-              <a:rPr lang="fr-FR" sz="1400" dirty="0" smtClean="0"/>
-              <a:t>«</a:t>
-            </a:r>
-            <a:r>
-              <a:rPr lang="fr-FR" sz="1400" dirty="0"/>
-              <a:t> </a:t>
-            </a:r>
-            <a:r>
-              <a:rPr lang="fr-FR" sz="1400" dirty="0" smtClean="0"/>
-              <a:t>tramway Paris »</a:t>
-            </a:r>
-          </a:p>
-          <a:p>
-            <a:pPr algn="ctr"/>
-            <a:r>
-              <a:rPr lang="fr-FR" sz="1400" dirty="0" smtClean="0"/>
+              <a:rPr lang="fr-FR" sz="1400" dirty="0"/>
+              <a:t>2032</a:t>
+            </a:r>
+          </a:p>
+          <a:p>
+            <a:pPr algn="ctr"/>
+            <a:r>
+              <a:rPr lang="fr-FR" sz="1400" dirty="0"/>
+              <a:t>« Grand Paris »</a:t>
+            </a:r>
+          </a:p>
+          <a:p>
+            <a:pPr algn="ctr"/>
+            <a:r>
+              <a:rPr lang="fr-FR" sz="1400" dirty="0"/>
               <a:t>Réel</a:t>
             </a:r>
           </a:p>
           <a:p>
             <a:pPr algn="ctr"/>
             <a:r>
+              <a:rPr lang="fr-FR" sz="1200" dirty="0"/>
+              <a:t>Fin de construction du Grand Paris </a:t>
+            </a:r>
+            <a:r>
               <a:rPr lang="fr-FR" sz="1200" dirty="0" smtClean="0"/>
-              <a:t>Mise en service du tramway de Paris</a:t>
+              <a:t>Express</a:t>
             </a:r>
             <a:endParaRPr lang="fr-FR" sz="1200" dirty="0"/>
           </a:p>
@@ -3969,29 +4062,33 @@
           <a:p>
             <a:pPr algn="ctr"/>
             <a:r>
-              <a:rPr lang="fr-FR" sz="1400" dirty="0" smtClean="0"/>
-              <a:t>2035</a:t>
-            </a:r>
-          </a:p>
-          <a:p>
-            <a:pPr algn="ctr"/>
-            <a:r>
-              <a:rPr lang="fr-FR" sz="1400" dirty="0" smtClean="0"/>
-              <a:t>« bateaux automatiques »</a:t>
-            </a:r>
-          </a:p>
-          <a:p>
-            <a:pPr algn="ctr"/>
-            <a:r>
-              <a:rPr lang="fr-FR" sz="1400" dirty="0" smtClean="0"/>
+              <a:rPr lang="fr-FR" sz="1400" dirty="0"/>
+              <a:t>1997</a:t>
+            </a:r>
+          </a:p>
+          <a:p>
+            <a:pPr algn="ctr"/>
+            <a:r>
+              <a:rPr lang="fr-FR" sz="1400" dirty="0"/>
+              <a:t>« Harry Potter »</a:t>
+            </a:r>
+          </a:p>
+          <a:p>
+            <a:pPr algn="ctr"/>
+            <a:r>
+              <a:rPr lang="fr-FR" sz="1400" dirty="0"/>
               <a:t>Réel</a:t>
             </a:r>
           </a:p>
           <a:p>
             <a:pPr algn="ctr"/>
             <a:r>
+              <a:rPr lang="fr-FR" sz="1200" dirty="0"/>
+              <a:t>Publication du premier tome de la série de livres Harry </a:t>
+            </a:r>
+            <a:r>
               <a:rPr lang="fr-FR" sz="1200" dirty="0" smtClean="0"/>
-              <a:t>Mise à flot des premiers bateaux automatiques</a:t>
+              <a:t>Potter</a:t>
             </a:r>
             <a:endParaRPr lang="fr-FR" sz="1200" dirty="0"/>
           </a:p>
@@ -4034,29 +4131,33 @@
           <a:p>
             <a:pPr algn="ctr"/>
             <a:r>
-              <a:rPr lang="fr-FR" sz="1400" dirty="0" smtClean="0"/>
-              <a:t>1985</a:t>
-            </a:r>
-          </a:p>
-          <a:p>
-            <a:pPr algn="ctr"/>
-            <a:r>
-              <a:rPr lang="fr-FR" sz="1400" dirty="0" smtClean="0"/>
-              <a:t>« trou ozone »</a:t>
-            </a:r>
-          </a:p>
-          <a:p>
-            <a:pPr algn="ctr"/>
-            <a:r>
-              <a:rPr lang="fr-FR" sz="1400" dirty="0" smtClean="0"/>
+              <a:rPr lang="fr-FR" sz="1400" dirty="0"/>
+              <a:t>2006</a:t>
+            </a:r>
+          </a:p>
+          <a:p>
+            <a:pPr algn="ctr"/>
+            <a:r>
+              <a:rPr lang="fr-FR" sz="1400" dirty="0"/>
+              <a:t>« tramway Paris »</a:t>
+            </a:r>
+          </a:p>
+          <a:p>
+            <a:pPr algn="ctr"/>
+            <a:r>
+              <a:rPr lang="fr-FR" sz="1400" dirty="0"/>
               <a:t>Réel</a:t>
             </a:r>
           </a:p>
           <a:p>
             <a:pPr algn="ctr"/>
             <a:r>
+              <a:rPr lang="fr-FR" sz="1200" dirty="0"/>
+              <a:t>Mise en service du tramway de </a:t>
+            </a:r>
+            <a:r>
               <a:rPr lang="fr-FR" sz="1200" dirty="0" smtClean="0"/>
-              <a:t>Découverte du trou dans la couche d’ozone</a:t>
+              <a:t>Paris</a:t>
             </a:r>
             <a:endParaRPr lang="fr-FR" sz="1200" dirty="0"/>
           </a:p>
@@ -4099,29 +4200,33 @@
           <a:p>
             <a:pPr algn="ctr"/>
             <a:r>
-              <a:rPr lang="fr-FR" sz="1400" dirty="0" smtClean="0"/>
-              <a:t>2044</a:t>
-            </a:r>
-          </a:p>
-          <a:p>
-            <a:pPr algn="ctr"/>
-            <a:r>
-              <a:rPr lang="fr-FR" sz="1400" dirty="0" smtClean="0"/>
-              <a:t>« thérapie Sida »</a:t>
-            </a:r>
-          </a:p>
-          <a:p>
-            <a:pPr algn="ctr"/>
-            <a:r>
-              <a:rPr lang="fr-FR" sz="1400" dirty="0" smtClean="0"/>
-              <a:t>Fictif</a:t>
-            </a:r>
-          </a:p>
-          <a:p>
-            <a:pPr algn="ctr"/>
+              <a:rPr lang="fr-FR" sz="1400" dirty="0"/>
+              <a:t>2020</a:t>
+            </a:r>
+          </a:p>
+          <a:p>
+            <a:pPr algn="ctr"/>
+            <a:r>
+              <a:rPr lang="fr-FR" sz="1400" dirty="0"/>
+              <a:t>« viandes artificielles »</a:t>
+            </a:r>
+          </a:p>
+          <a:p>
+            <a:pPr algn="ctr"/>
+            <a:r>
+              <a:rPr lang="fr-FR" sz="1400" dirty="0"/>
+              <a:t>Réel</a:t>
+            </a:r>
+          </a:p>
+          <a:p>
+            <a:pPr algn="ctr"/>
+            <a:r>
+              <a:rPr lang="fr-FR" sz="1200" dirty="0"/>
+              <a:t>Commercialisation de viandes </a:t>
+            </a:r>
             <a:r>
               <a:rPr lang="fr-FR" sz="1200" dirty="0" smtClean="0"/>
-              <a:t>Mise au point d’une thérapie génique contre le Sida</a:t>
+              <a:t>artificielles</a:t>
             </a:r>
             <a:endParaRPr lang="fr-FR" sz="1200" dirty="0"/>
           </a:p>
@@ -4164,29 +4269,33 @@
           <a:p>
             <a:pPr algn="ctr"/>
             <a:r>
-              <a:rPr lang="fr-FR" sz="1400" dirty="0" smtClean="0"/>
-              <a:t>2012</a:t>
-            </a:r>
-          </a:p>
-          <a:p>
-            <a:pPr algn="ctr"/>
-            <a:r>
-              <a:rPr lang="fr-FR" sz="1400" dirty="0" smtClean="0"/>
-              <a:t>« Curiosity Mars »</a:t>
-            </a:r>
-          </a:p>
-          <a:p>
-            <a:pPr algn="ctr"/>
-            <a:r>
-              <a:rPr lang="fr-FR" sz="1400" dirty="0" smtClean="0"/>
+              <a:rPr lang="fr-FR" sz="1400" dirty="0"/>
+              <a:t>2035</a:t>
+            </a:r>
+          </a:p>
+          <a:p>
+            <a:pPr algn="ctr"/>
+            <a:r>
+              <a:rPr lang="fr-FR" sz="1400" dirty="0"/>
+              <a:t>« bateaux automatiques »</a:t>
+            </a:r>
+          </a:p>
+          <a:p>
+            <a:pPr algn="ctr"/>
+            <a:r>
+              <a:rPr lang="fr-FR" sz="1400" dirty="0"/>
               <a:t>Réel</a:t>
             </a:r>
           </a:p>
           <a:p>
             <a:pPr algn="ctr"/>
             <a:r>
+              <a:rPr lang="fr-FR" sz="1200" dirty="0"/>
+              <a:t>Mise à flot des premiers bateaux </a:t>
+            </a:r>
+            <a:r>
               <a:rPr lang="fr-FR" sz="1200" dirty="0" smtClean="0"/>
-              <a:t>Le robot astromobile Curiosity atterrit sur Mars</a:t>
+              <a:t>automatiques</a:t>
             </a:r>
             <a:endParaRPr lang="fr-FR" sz="1200" dirty="0"/>
           </a:p>
@@ -4229,29 +4338,33 @@
           <a:p>
             <a:pPr algn="ctr"/>
             <a:r>
-              <a:rPr lang="fr-FR" sz="1400" dirty="0" smtClean="0"/>
-              <a:t>2032</a:t>
-            </a:r>
-          </a:p>
-          <a:p>
-            <a:pPr algn="ctr"/>
-            <a:r>
-              <a:rPr lang="fr-FR" sz="1400" dirty="0" smtClean="0"/>
-              <a:t>« Grand Paris »</a:t>
-            </a:r>
-          </a:p>
-          <a:p>
-            <a:pPr algn="ctr"/>
-            <a:r>
-              <a:rPr lang="fr-FR" sz="1400" dirty="0" smtClean="0"/>
-              <a:t>Réel</a:t>
-            </a:r>
-          </a:p>
-          <a:p>
-            <a:pPr algn="ctr"/>
+              <a:rPr lang="fr-FR" sz="1400" dirty="0"/>
+              <a:t>2044</a:t>
+            </a:r>
+          </a:p>
+          <a:p>
+            <a:pPr algn="ctr"/>
+            <a:r>
+              <a:rPr lang="fr-FR" sz="1400" dirty="0"/>
+              <a:t>« thérapie Sida »</a:t>
+            </a:r>
+          </a:p>
+          <a:p>
+            <a:pPr algn="ctr"/>
+            <a:r>
+              <a:rPr lang="fr-FR" sz="1400" dirty="0"/>
+              <a:t>Fictif</a:t>
+            </a:r>
+          </a:p>
+          <a:p>
+            <a:pPr algn="ctr"/>
+            <a:r>
+              <a:rPr lang="fr-FR" sz="1200" dirty="0"/>
+              <a:t>Mise au point d’une thérapie génique contre le </a:t>
+            </a:r>
             <a:r>
               <a:rPr lang="fr-FR" sz="1200" dirty="0" smtClean="0"/>
-              <a:t>Fin de construction du Grand Paris Express</a:t>
+              <a:t>Sida</a:t>
             </a:r>
             <a:endParaRPr lang="fr-FR" sz="1200" dirty="0"/>
           </a:p>
@@ -4294,29 +4407,33 @@
           <a:p>
             <a:pPr algn="ctr"/>
             <a:r>
-              <a:rPr lang="fr-FR" sz="1400" dirty="0" smtClean="0"/>
-              <a:t>2020</a:t>
-            </a:r>
-          </a:p>
-          <a:p>
-            <a:pPr algn="ctr"/>
-            <a:r>
-              <a:rPr lang="fr-FR" sz="1400" dirty="0" smtClean="0"/>
-              <a:t>« viandes artificielles »</a:t>
-            </a:r>
-          </a:p>
-          <a:p>
-            <a:pPr algn="ctr"/>
-            <a:r>
-              <a:rPr lang="fr-FR" sz="1400" dirty="0" smtClean="0"/>
+              <a:rPr lang="fr-FR" sz="1400" dirty="0"/>
+              <a:t>2041</a:t>
+            </a:r>
+          </a:p>
+          <a:p>
+            <a:pPr algn="ctr"/>
+            <a:r>
+              <a:rPr lang="fr-FR" sz="1400" dirty="0"/>
+              <a:t>« tunnel Béring »</a:t>
+            </a:r>
+          </a:p>
+          <a:p>
+            <a:pPr algn="ctr"/>
+            <a:r>
+              <a:rPr lang="fr-FR" sz="1400" dirty="0"/>
               <a:t>Réel</a:t>
             </a:r>
           </a:p>
           <a:p>
             <a:pPr algn="ctr"/>
             <a:r>
+              <a:rPr lang="fr-FR" sz="1200" dirty="0"/>
+              <a:t>Ouverture du tunnel sous le détroit de </a:t>
+            </a:r>
+            <a:r>
               <a:rPr lang="fr-FR" sz="1200" dirty="0" smtClean="0"/>
-              <a:t>Commercialisation de viandes artificielles</a:t>
+              <a:t>Béring</a:t>
             </a:r>
             <a:endParaRPr lang="fr-FR" sz="1200" dirty="0"/>
           </a:p>
@@ -4359,29 +4476,33 @@
           <a:p>
             <a:pPr algn="ctr"/>
             <a:r>
-              <a:rPr lang="fr-FR" sz="1400" dirty="0" smtClean="0"/>
-              <a:t>Début 2019</a:t>
-            </a:r>
-          </a:p>
-          <a:p>
-            <a:pPr algn="ctr"/>
-            <a:r>
-              <a:rPr lang="fr-FR" sz="1400" dirty="0" smtClean="0"/>
-              <a:t>« Netflix Friends »</a:t>
-            </a:r>
-          </a:p>
-          <a:p>
-            <a:pPr algn="ctr"/>
-            <a:r>
-              <a:rPr lang="fr-FR" sz="1400" dirty="0" smtClean="0"/>
+              <a:rPr lang="fr-FR" sz="1400" dirty="0"/>
+              <a:t>1988</a:t>
+            </a:r>
+          </a:p>
+          <a:p>
+            <a:pPr algn="ctr"/>
+            <a:r>
+              <a:rPr lang="fr-FR" sz="1400" dirty="0"/>
+              <a:t>« JO Nagoya »</a:t>
+            </a:r>
+          </a:p>
+          <a:p>
+            <a:pPr algn="ctr"/>
+            <a:r>
+              <a:rPr lang="fr-FR" sz="1400" dirty="0"/>
               <a:t>Fictif</a:t>
             </a:r>
           </a:p>
           <a:p>
             <a:pPr algn="ctr"/>
             <a:r>
+              <a:rPr lang="fr-FR" sz="1200" dirty="0"/>
+              <a:t>Jeux Olympiques à </a:t>
+            </a:r>
+            <a:r>
               <a:rPr lang="fr-FR" sz="1200" dirty="0" smtClean="0"/>
-              <a:t>Netflix annonce une nouvelle saison de la série Friends</a:t>
+              <a:t>Nagoya</a:t>
             </a:r>
             <a:endParaRPr lang="fr-FR" sz="1200" dirty="0"/>
           </a:p>
@@ -4424,29 +4545,37 @@
           <a:p>
             <a:pPr algn="ctr"/>
             <a:r>
-              <a:rPr lang="fr-FR" sz="1400" dirty="0" smtClean="0"/>
-              <a:t>1991</a:t>
-            </a:r>
-          </a:p>
-          <a:p>
-            <a:pPr algn="ctr"/>
-            <a:r>
-              <a:rPr lang="fr-FR" sz="1400" dirty="0" smtClean="0"/>
-              <a:t>« dislocation URSS »</a:t>
-            </a:r>
-          </a:p>
-          <a:p>
-            <a:pPr algn="ctr"/>
-            <a:r>
-              <a:rPr lang="fr-FR" sz="1400" dirty="0" smtClean="0"/>
+              <a:rPr lang="fr-FR" sz="1400" dirty="0"/>
+              <a:t>2018</a:t>
+            </a:r>
+          </a:p>
+          <a:p>
+            <a:pPr algn="ctr"/>
+            <a:r>
+              <a:rPr lang="fr-FR" sz="1400" dirty="0"/>
+              <a:t>« Simone Veil »</a:t>
+            </a:r>
+          </a:p>
+          <a:p>
+            <a:pPr algn="ctr"/>
+            <a:r>
+              <a:rPr lang="fr-FR" sz="1400" dirty="0"/>
               <a:t>Réel</a:t>
             </a:r>
           </a:p>
           <a:p>
             <a:pPr algn="ctr"/>
             <a:r>
+              <a:rPr lang="fr-FR" sz="1200" dirty="0" err="1"/>
+              <a:t>Panthéonisation</a:t>
+            </a:r>
+            <a:r>
+              <a:rPr lang="fr-FR" sz="1200" dirty="0"/>
+              <a:t> de Simone </a:t>
+            </a:r>
+            <a:r>
               <a:rPr lang="fr-FR" sz="1200" dirty="0" smtClean="0"/>
-              <a:t>Dislocation de l’URSS</a:t>
+              <a:t>Veil</a:t>
             </a:r>
             <a:endParaRPr lang="fr-FR" sz="1200" dirty="0"/>
           </a:p>
@@ -4489,29 +4618,33 @@
           <a:p>
             <a:pPr algn="ctr"/>
             <a:r>
-              <a:rPr lang="fr-FR" sz="1400" dirty="0" smtClean="0"/>
-              <a:t>1994</a:t>
-            </a:r>
-          </a:p>
-          <a:p>
-            <a:pPr algn="ctr"/>
-            <a:r>
-              <a:rPr lang="fr-FR" sz="1400" dirty="0" smtClean="0"/>
-              <a:t>« métro Bordeaux »</a:t>
-            </a:r>
-          </a:p>
-          <a:p>
-            <a:pPr algn="ctr"/>
-            <a:r>
-              <a:rPr lang="fr-FR" sz="1400" dirty="0" smtClean="0"/>
+              <a:rPr lang="fr-FR" sz="1400" dirty="0"/>
+              <a:t>2000</a:t>
+            </a:r>
+          </a:p>
+          <a:p>
+            <a:pPr algn="ctr"/>
+            <a:r>
+              <a:rPr lang="fr-FR" sz="1400" dirty="0"/>
+              <a:t>« Lettonie Eurovision »</a:t>
+            </a:r>
+          </a:p>
+          <a:p>
+            <a:pPr algn="ctr"/>
+            <a:r>
+              <a:rPr lang="fr-FR" sz="1400" dirty="0"/>
               <a:t>Fictif</a:t>
             </a:r>
           </a:p>
           <a:p>
             <a:pPr algn="ctr"/>
             <a:r>
+              <a:rPr lang="fr-FR" sz="1200" dirty="0"/>
+              <a:t>Victoire de la Lettonie au concours Eurovision de la </a:t>
+            </a:r>
+            <a:r>
               <a:rPr lang="fr-FR" sz="1200" dirty="0" smtClean="0"/>
-              <a:t>Mise en service du métro de Bordeaux</a:t>
+              <a:t>chanson</a:t>
             </a:r>
             <a:endParaRPr lang="fr-FR" sz="1200" dirty="0"/>
           </a:p>
@@ -4554,29 +4687,33 @@
           <a:p>
             <a:pPr algn="ctr"/>
             <a:r>
-              <a:rPr lang="fr-FR" sz="1400" dirty="0" smtClean="0"/>
-              <a:t>2015</a:t>
-            </a:r>
-          </a:p>
-          <a:p>
-            <a:pPr algn="ctr"/>
-            <a:r>
-              <a:rPr lang="fr-FR" sz="1400" dirty="0" smtClean="0"/>
-              <a:t>« musée Metallica »</a:t>
-            </a:r>
-          </a:p>
-          <a:p>
-            <a:pPr algn="ctr"/>
-            <a:r>
-              <a:rPr lang="fr-FR" sz="1400" dirty="0" smtClean="0"/>
-              <a:t>Fictif</a:t>
-            </a:r>
-          </a:p>
-          <a:p>
-            <a:pPr algn="ctr"/>
+              <a:rPr lang="fr-FR" sz="1400" dirty="0"/>
+              <a:t>Fin 2019</a:t>
+            </a:r>
+          </a:p>
+          <a:p>
+            <a:pPr algn="ctr"/>
+            <a:r>
+              <a:rPr lang="fr-FR" sz="1400" dirty="0"/>
+              <a:t>« coupe football »</a:t>
+            </a:r>
+          </a:p>
+          <a:p>
+            <a:pPr algn="ctr"/>
+            <a:r>
+              <a:rPr lang="fr-FR" sz="1400" dirty="0"/>
+              <a:t>Réel</a:t>
+            </a:r>
+          </a:p>
+          <a:p>
+            <a:pPr algn="ctr"/>
+            <a:r>
+              <a:rPr lang="fr-FR" sz="1200" dirty="0"/>
+              <a:t>Coupe du monde de football </a:t>
+            </a:r>
             <a:r>
               <a:rPr lang="fr-FR" sz="1200" dirty="0" smtClean="0"/>
-              <a:t>Inauguration du musée Metallica à Los Angeles</a:t>
+              <a:t>féminin</a:t>
             </a:r>
             <a:endParaRPr lang="fr-FR" sz="1200" dirty="0"/>
           </a:p>
@@ -4619,29 +4756,33 @@
           <a:p>
             <a:pPr algn="ctr"/>
             <a:r>
-              <a:rPr lang="fr-FR" sz="1400" dirty="0" smtClean="0"/>
-              <a:t>1997</a:t>
-            </a:r>
-          </a:p>
-          <a:p>
-            <a:pPr algn="ctr"/>
-            <a:r>
-              <a:rPr lang="fr-FR" sz="1400" dirty="0" smtClean="0"/>
-              <a:t>« Harry Potter »</a:t>
-            </a:r>
-          </a:p>
-          <a:p>
-            <a:pPr algn="ctr"/>
-            <a:r>
-              <a:rPr lang="fr-FR" sz="1400" dirty="0" smtClean="0"/>
+              <a:rPr lang="fr-FR" sz="1400" dirty="0"/>
+              <a:t>2047</a:t>
+            </a:r>
+          </a:p>
+          <a:p>
+            <a:pPr algn="ctr"/>
+            <a:r>
+              <a:rPr lang="fr-FR" sz="1400" dirty="0"/>
+              <a:t>« 9.5 milliards »</a:t>
+            </a:r>
+          </a:p>
+          <a:p>
+            <a:pPr algn="ctr"/>
+            <a:r>
+              <a:rPr lang="fr-FR" sz="1400" dirty="0"/>
               <a:t>Réel</a:t>
             </a:r>
           </a:p>
           <a:p>
             <a:pPr algn="ctr"/>
             <a:r>
+              <a:rPr lang="fr-FR" sz="1200" dirty="0"/>
+              <a:t>La population mondiale atteint 9.5 </a:t>
+            </a:r>
+            <a:r>
               <a:rPr lang="fr-FR" sz="1200" dirty="0" smtClean="0"/>
-              <a:t>Publication du premier tome de la série de livres Harry Potter</a:t>
+              <a:t>milliards</a:t>
             </a:r>
             <a:endParaRPr lang="fr-FR" sz="1200" dirty="0"/>
           </a:p>
@@ -4684,29 +4825,33 @@
           <a:p>
             <a:pPr algn="ctr"/>
             <a:r>
-              <a:rPr lang="fr-FR" sz="1400" dirty="0" smtClean="0"/>
-              <a:t>2000</a:t>
-            </a:r>
-          </a:p>
-          <a:p>
-            <a:pPr algn="ctr"/>
-            <a:r>
-              <a:rPr lang="fr-FR" sz="1400" dirty="0" smtClean="0"/>
-              <a:t>« Lettonie Eurovision »</a:t>
-            </a:r>
-          </a:p>
-          <a:p>
-            <a:pPr algn="ctr"/>
-            <a:r>
-              <a:rPr lang="fr-FR" sz="1400" dirty="0" smtClean="0"/>
-              <a:t>Fictif</a:t>
-            </a:r>
-          </a:p>
-          <a:p>
-            <a:pPr algn="ctr"/>
+              <a:rPr lang="fr-FR" sz="1400" dirty="0"/>
+              <a:t>2053</a:t>
+            </a:r>
+          </a:p>
+          <a:p>
+            <a:pPr algn="ctr"/>
+            <a:r>
+              <a:rPr lang="fr-FR" sz="1400" dirty="0"/>
+              <a:t>« gaz renouvelable »</a:t>
+            </a:r>
+          </a:p>
+          <a:p>
+            <a:pPr algn="ctr"/>
+            <a:r>
+              <a:rPr lang="fr-FR" sz="1400" dirty="0"/>
+              <a:t>Réel</a:t>
+            </a:r>
+          </a:p>
+          <a:p>
+            <a:pPr algn="ctr"/>
+            <a:r>
+              <a:rPr lang="fr-FR" sz="1200" dirty="0"/>
+              <a:t>Le réseau de gaz français devient 100% </a:t>
+            </a:r>
             <a:r>
               <a:rPr lang="fr-FR" sz="1200" dirty="0" smtClean="0"/>
-              <a:t>Victoire de la Lettonie au concours Eurovision de la chanson</a:t>
+              <a:t>renouvelable</a:t>
             </a:r>
             <a:endParaRPr lang="fr-FR" sz="1200" dirty="0"/>
           </a:p>
@@ -4749,29 +4894,33 @@
           <a:p>
             <a:pPr algn="ctr"/>
             <a:r>
-              <a:rPr lang="fr-FR" sz="1400" dirty="0" smtClean="0"/>
-              <a:t>2003</a:t>
-            </a:r>
-          </a:p>
-          <a:p>
-            <a:pPr algn="ctr"/>
-            <a:r>
-              <a:rPr lang="fr-FR" sz="1400" dirty="0" smtClean="0"/>
-              <a:t>« génome humain »</a:t>
-            </a:r>
-          </a:p>
-          <a:p>
-            <a:pPr algn="ctr"/>
-            <a:r>
-              <a:rPr lang="fr-FR" sz="1400" dirty="0" smtClean="0"/>
-              <a:t>Réel</a:t>
-            </a:r>
-          </a:p>
-          <a:p>
-            <a:pPr algn="ctr"/>
+              <a:rPr lang="fr-FR" sz="1400" dirty="0"/>
+              <a:t>1994</a:t>
+            </a:r>
+          </a:p>
+          <a:p>
+            <a:pPr algn="ctr"/>
+            <a:r>
+              <a:rPr lang="fr-FR" sz="1400" dirty="0"/>
+              <a:t>« métro Bordeaux »</a:t>
+            </a:r>
+          </a:p>
+          <a:p>
+            <a:pPr algn="ctr"/>
+            <a:r>
+              <a:rPr lang="fr-FR" sz="1400" dirty="0"/>
+              <a:t>Fictif</a:t>
+            </a:r>
+          </a:p>
+          <a:p>
+            <a:pPr algn="ctr"/>
+            <a:r>
+              <a:rPr lang="fr-FR" sz="1200" dirty="0"/>
+              <a:t>Mise en service du métro de </a:t>
+            </a:r>
             <a:r>
               <a:rPr lang="fr-FR" sz="1200" dirty="0" smtClean="0"/>
-              <a:t>Séquençage complet du génome humain</a:t>
+              <a:t>Bordeaux</a:t>
             </a:r>
             <a:endParaRPr lang="fr-FR" sz="1200" dirty="0"/>
           </a:p>

</xml_diff>